<commit_message>
Updated login and powerpoint
</commit_message>
<xml_diff>
--- a/docs/Layout200724.pptx
+++ b/docs/Layout200724.pptx
@@ -5,10 +5,10 @@
     <p:sldMasterId id="2147483648" r:id="rId4"/>
   </p:sldMasterIdLst>
   <p:notesMasterIdLst>
-    <p:notesMasterId r:id="rId14"/>
+    <p:notesMasterId r:id="rId15"/>
   </p:notesMasterIdLst>
   <p:handoutMasterIdLst>
-    <p:handoutMasterId r:id="rId15"/>
+    <p:handoutMasterId r:id="rId16"/>
   </p:handoutMasterIdLst>
   <p:sldIdLst>
     <p:sldId id="256" r:id="rId5"/>
@@ -19,7 +19,8 @@
     <p:sldId id="265" r:id="rId10"/>
     <p:sldId id="268" r:id="rId11"/>
     <p:sldId id="266" r:id="rId12"/>
-    <p:sldId id="267" r:id="rId13"/>
+    <p:sldId id="269" r:id="rId13"/>
+    <p:sldId id="267" r:id="rId14"/>
   </p:sldIdLst>
   <p:sldSz cx="12192000" cy="6858000"/>
   <p:notesSz cx="6858000" cy="9144000"/>
@@ -229,7 +230,7 @@
           <a:p>
             <a:fld id="{0DC994AA-C437-4EF4-8BEF-0B832D7FA420}" type="datetimeFigureOut">
               <a:rPr lang="en-US" smtClean="0"/>
-              <a:t>7/20/2024</a:t>
+              <a:t>7/24/2024</a:t>
             </a:fld>
             <a:endParaRPr lang="en-US" dirty="0"/>
           </a:p>
@@ -406,7 +407,7 @@
           <a:p>
             <a:fld id="{FB20CE03-6C3A-EB4D-A9B1-7EFD38B58412}" type="datetimeFigureOut">
               <a:rPr lang="en-US" smtClean="0"/>
-              <a:t>7/20/2024</a:t>
+              <a:t>7/24/2024</a:t>
             </a:fld>
             <a:endParaRPr lang="en-US" dirty="0"/>
           </a:p>
@@ -757,6 +758,90 @@
 </p:notes>
 </file>
 
+<file path=ppt/notesSlides/notesSlide10.xml><?xml version="1.0" encoding="utf-8"?>
+<p:notes xmlns:a="http://schemas.openxmlformats.org/drawingml/2006/main" xmlns:r="http://schemas.openxmlformats.org/officeDocument/2006/relationships" xmlns:p="http://schemas.openxmlformats.org/presentationml/2006/main">
+  <p:cSld>
+    <p:spTree>
+      <p:nvGrpSpPr>
+        <p:cNvPr id="1" name=""/>
+        <p:cNvGrpSpPr/>
+        <p:nvPr/>
+      </p:nvGrpSpPr>
+      <p:grpSpPr>
+        <a:xfrm>
+          <a:off x="0" y="0"/>
+          <a:ext cx="0" cy="0"/>
+          <a:chOff x="0" y="0"/>
+          <a:chExt cx="0" cy="0"/>
+        </a:xfrm>
+      </p:grpSpPr>
+      <p:sp>
+        <p:nvSpPr>
+          <p:cNvPr id="2" name="Slide Image Placeholder 1"/>
+          <p:cNvSpPr>
+            <a:spLocks noGrp="1" noRot="1" noChangeAspect="1"/>
+          </p:cNvSpPr>
+          <p:nvPr>
+            <p:ph type="sldImg"/>
+          </p:nvPr>
+        </p:nvSpPr>
+        <p:spPr/>
+      </p:sp>
+      <p:sp>
+        <p:nvSpPr>
+          <p:cNvPr id="3" name="Notes Placeholder 2"/>
+          <p:cNvSpPr>
+            <a:spLocks noGrp="1"/>
+          </p:cNvSpPr>
+          <p:nvPr>
+            <p:ph type="body" idx="1"/>
+          </p:nvPr>
+        </p:nvSpPr>
+        <p:spPr/>
+        <p:txBody>
+          <a:bodyPr/>
+          <a:lstStyle/>
+          <a:p>
+            <a:endParaRPr lang="en-US" dirty="0"/>
+          </a:p>
+        </p:txBody>
+      </p:sp>
+      <p:sp>
+        <p:nvSpPr>
+          <p:cNvPr id="4" name="Slide Number Placeholder 3"/>
+          <p:cNvSpPr>
+            <a:spLocks noGrp="1"/>
+          </p:cNvSpPr>
+          <p:nvPr>
+            <p:ph type="sldNum" sz="quarter" idx="5"/>
+          </p:nvPr>
+        </p:nvSpPr>
+        <p:spPr/>
+        <p:txBody>
+          <a:bodyPr/>
+          <a:lstStyle/>
+          <a:p>
+            <a:fld id="{8B57D50D-BAA9-464B-B391-243138E078D8}" type="slidenum">
+              <a:rPr lang="en-US" smtClean="0"/>
+              <a:t>10</a:t>
+            </a:fld>
+            <a:endParaRPr lang="en-US" dirty="0"/>
+          </a:p>
+        </p:txBody>
+      </p:sp>
+    </p:spTree>
+    <p:extLst>
+      <p:ext uri="{BB962C8B-B14F-4D97-AF65-F5344CB8AC3E}">
+        <p14:creationId xmlns:p14="http://schemas.microsoft.com/office/powerpoint/2010/main" val="2754192709"/>
+      </p:ext>
+    </p:extLst>
+  </p:cSld>
+  <p:clrMapOvr>
+    <a:masterClrMapping/>
+  </p:clrMapOvr>
+</p:notes>
+</file>
+
 <file path=ppt/notesSlides/notesSlide2.xml><?xml version="1.0" encoding="utf-8"?>
 <p:notes xmlns:a="http://schemas.openxmlformats.org/drawingml/2006/main" xmlns:r="http://schemas.openxmlformats.org/officeDocument/2006/relationships" xmlns:p="http://schemas.openxmlformats.org/presentationml/2006/main">
   <p:cSld>
@@ -1419,7 +1504,7 @@
     </p:spTree>
     <p:extLst>
       <p:ext uri="{BB962C8B-B14F-4D97-AF65-F5344CB8AC3E}">
-        <p14:creationId xmlns:p14="http://schemas.microsoft.com/office/powerpoint/2010/main" val="2754192709"/>
+        <p14:creationId xmlns:p14="http://schemas.microsoft.com/office/powerpoint/2010/main" val="2853176394"/>
       </p:ext>
     </p:extLst>
   </p:cSld>
@@ -2961,7 +3046,7 @@
           <a:p>
             <a:fld id="{D6D8061D-18C3-4F4F-85EF-561633F58754}" type="datetimeFigureOut">
               <a:rPr lang="en-US" smtClean="0"/>
-              <a:t>7/20/2024</a:t>
+              <a:t>7/24/2024</a:t>
             </a:fld>
             <a:endParaRPr lang="en-US" dirty="0"/>
           </a:p>
@@ -3104,7 +3189,7 @@
           <a:p>
             <a:fld id="{D6D8061D-18C3-4F4F-85EF-561633F58754}" type="datetimeFigureOut">
               <a:rPr lang="en-US" smtClean="0"/>
-              <a:t>7/20/2024</a:t>
+              <a:t>7/24/2024</a:t>
             </a:fld>
             <a:endParaRPr lang="en-US" dirty="0"/>
           </a:p>
@@ -4249,7 +4334,7 @@
           <a:p>
             <a:fld id="{D6D8061D-18C3-4F4F-85EF-561633F58754}" type="datetimeFigureOut">
               <a:rPr lang="en-US" smtClean="0"/>
-              <a:t>7/20/2024</a:t>
+              <a:t>7/24/2024</a:t>
             </a:fld>
             <a:endParaRPr lang="en-US" dirty="0"/>
           </a:p>
@@ -5572,7 +5657,7 @@
           <a:p>
             <a:fld id="{D6D8061D-18C3-4F4F-85EF-561633F58754}" type="datetimeFigureOut">
               <a:rPr lang="en-US" smtClean="0"/>
-              <a:t>7/20/2024</a:t>
+              <a:t>7/24/2024</a:t>
             </a:fld>
             <a:endParaRPr lang="en-US" dirty="0"/>
           </a:p>
@@ -6842,7 +6927,7 @@
           <a:p>
             <a:fld id="{D6D8061D-18C3-4F4F-85EF-561633F58754}" type="datetimeFigureOut">
               <a:rPr lang="en-US" smtClean="0"/>
-              <a:t>7/20/2024</a:t>
+              <a:t>7/24/2024</a:t>
             </a:fld>
             <a:endParaRPr lang="en-US" dirty="0"/>
           </a:p>
@@ -7907,7 +7992,7 @@
           <a:p>
             <a:fld id="{D6D8061D-18C3-4F4F-85EF-561633F58754}" type="datetimeFigureOut">
               <a:rPr lang="en-US" smtClean="0"/>
-              <a:t>7/20/2024</a:t>
+              <a:t>7/24/2024</a:t>
             </a:fld>
             <a:endParaRPr lang="en-US" dirty="0"/>
           </a:p>
@@ -8316,7 +8401,7 @@
           <a:p>
             <a:fld id="{D6D8061D-18C3-4F4F-85EF-561633F58754}" type="datetimeFigureOut">
               <a:rPr lang="en-US" smtClean="0"/>
-              <a:t>7/20/2024</a:t>
+              <a:t>7/24/2024</a:t>
             </a:fld>
             <a:endParaRPr lang="en-US" dirty="0"/>
           </a:p>
@@ -9287,7 +9372,7 @@
           <a:p>
             <a:fld id="{D6D8061D-18C3-4F4F-85EF-561633F58754}" type="datetimeFigureOut">
               <a:rPr lang="en-US" smtClean="0"/>
-              <a:t>7/20/2024</a:t>
+              <a:t>7/24/2024</a:t>
             </a:fld>
             <a:endParaRPr lang="en-US" dirty="0"/>
           </a:p>
@@ -10124,7 +10209,7 @@
           <a:p>
             <a:fld id="{D6D8061D-18C3-4F4F-85EF-561633F58754}" type="datetimeFigureOut">
               <a:rPr lang="en-US" smtClean="0"/>
-              <a:t>7/20/2024</a:t>
+              <a:t>7/24/2024</a:t>
             </a:fld>
             <a:endParaRPr lang="en-US" dirty="0"/>
           </a:p>
@@ -10365,7 +10450,7 @@
           <a:p>
             <a:fld id="{D6D8061D-18C3-4F4F-85EF-561633F58754}" type="datetimeFigureOut">
               <a:rPr lang="en-US" smtClean="0"/>
-              <a:t>7/20/2024</a:t>
+              <a:t>7/24/2024</a:t>
             </a:fld>
             <a:endParaRPr lang="en-US" dirty="0"/>
           </a:p>
@@ -10837,6 +10922,284 @@
 </p:sld>
 </file>
 
+<file path=ppt/slides/slide10.xml><?xml version="1.0" encoding="utf-8"?>
+<p:sld xmlns:a="http://schemas.openxmlformats.org/drawingml/2006/main" xmlns:r="http://schemas.openxmlformats.org/officeDocument/2006/relationships" xmlns:p="http://schemas.openxmlformats.org/presentationml/2006/main">
+  <p:cSld>
+    <p:spTree>
+      <p:nvGrpSpPr>
+        <p:cNvPr id="1" name=""/>
+        <p:cNvGrpSpPr/>
+        <p:nvPr/>
+      </p:nvGrpSpPr>
+      <p:grpSpPr>
+        <a:xfrm>
+          <a:off x="0" y="0"/>
+          <a:ext cx="0" cy="0"/>
+          <a:chOff x="0" y="0"/>
+          <a:chExt cx="0" cy="0"/>
+        </a:xfrm>
+      </p:grpSpPr>
+      <p:sp>
+        <p:nvSpPr>
+          <p:cNvPr id="2" name="Title 1">
+            <a:extLst>
+              <a:ext uri="{FF2B5EF4-FFF2-40B4-BE49-F238E27FC236}">
+                <a16:creationId xmlns:a16="http://schemas.microsoft.com/office/drawing/2014/main" id="{9635F5E3-2B1C-7C0A-8581-67A9052D13AA}"/>
+              </a:ext>
+            </a:extLst>
+          </p:cNvPr>
+          <p:cNvSpPr>
+            <a:spLocks noGrp="1"/>
+          </p:cNvSpPr>
+          <p:nvPr>
+            <p:ph type="title"/>
+          </p:nvPr>
+        </p:nvSpPr>
+        <p:spPr>
+          <a:xfrm>
+            <a:off x="838200" y="365125"/>
+            <a:ext cx="10515600" cy="1325563"/>
+          </a:xfrm>
+        </p:spPr>
+        <p:txBody>
+          <a:bodyPr anchor="ctr">
+            <a:normAutofit/>
+          </a:bodyPr>
+          <a:lstStyle/>
+          <a:p>
+            <a:pPr algn="ctr"/>
+            <a:r>
+              <a:rPr lang="en-US" dirty="0" err="1"/>
+              <a:t>Regulasi</a:t>
+            </a:r>
+            <a:endParaRPr lang="en-US" dirty="0"/>
+          </a:p>
+        </p:txBody>
+      </p:sp>
+      <p:pic>
+        <p:nvPicPr>
+          <p:cNvPr id="5" name="Picture 4" descr="A screenshot of a video game&#10;&#10;Description automatically generated">
+            <a:extLst>
+              <a:ext uri="{FF2B5EF4-FFF2-40B4-BE49-F238E27FC236}">
+                <a16:creationId xmlns:a16="http://schemas.microsoft.com/office/drawing/2014/main" id="{4CD07A70-77E0-8001-AFF5-2674F93BAB35}"/>
+              </a:ext>
+            </a:extLst>
+          </p:cNvPr>
+          <p:cNvPicPr>
+            <a:picLocks noChangeAspect="1"/>
+          </p:cNvPicPr>
+          <p:nvPr/>
+        </p:nvPicPr>
+        <p:blipFill>
+          <a:blip r:embed="rId3"/>
+          <a:stretch>
+            <a:fillRect/>
+          </a:stretch>
+        </p:blipFill>
+        <p:spPr>
+          <a:xfrm>
+            <a:off x="1609766" y="1690688"/>
+            <a:ext cx="8972468" cy="4261922"/>
+          </a:xfrm>
+          <a:prstGeom prst="rect">
+            <a:avLst/>
+          </a:prstGeom>
+          <a:noFill/>
+        </p:spPr>
+      </p:pic>
+      <p:pic>
+        <p:nvPicPr>
+          <p:cNvPr id="4" name="Picture 3">
+            <a:extLst>
+              <a:ext uri="{FF2B5EF4-FFF2-40B4-BE49-F238E27FC236}">
+                <a16:creationId xmlns:a16="http://schemas.microsoft.com/office/drawing/2014/main" id="{0FA58331-C566-A688-FB25-FBA11223CD66}"/>
+              </a:ext>
+            </a:extLst>
+          </p:cNvPr>
+          <p:cNvPicPr>
+            <a:picLocks noChangeAspect="1"/>
+          </p:cNvPicPr>
+          <p:nvPr/>
+        </p:nvPicPr>
+        <p:blipFill>
+          <a:blip r:embed="rId4"/>
+          <a:stretch>
+            <a:fillRect/>
+          </a:stretch>
+        </p:blipFill>
+        <p:spPr>
+          <a:xfrm>
+            <a:off x="1609766" y="1690688"/>
+            <a:ext cx="8972468" cy="4280400"/>
+          </a:xfrm>
+          <a:prstGeom prst="rect">
+            <a:avLst/>
+          </a:prstGeom>
+        </p:spPr>
+      </p:pic>
+      <p:pic>
+        <p:nvPicPr>
+          <p:cNvPr id="6" name="Picture 5">
+            <a:extLst>
+              <a:ext uri="{FF2B5EF4-FFF2-40B4-BE49-F238E27FC236}">
+                <a16:creationId xmlns:a16="http://schemas.microsoft.com/office/drawing/2014/main" id="{BF49308E-2888-7DF5-F5CE-FE1E4E7A9010}"/>
+              </a:ext>
+            </a:extLst>
+          </p:cNvPr>
+          <p:cNvPicPr>
+            <a:picLocks noChangeAspect="1"/>
+          </p:cNvPicPr>
+          <p:nvPr/>
+        </p:nvPicPr>
+        <p:blipFill>
+          <a:blip r:embed="rId5"/>
+          <a:stretch>
+            <a:fillRect/>
+          </a:stretch>
+        </p:blipFill>
+        <p:spPr>
+          <a:xfrm>
+            <a:off x="1609765" y="1690688"/>
+            <a:ext cx="8972467" cy="4290770"/>
+          </a:xfrm>
+          <a:prstGeom prst="rect">
+            <a:avLst/>
+          </a:prstGeom>
+        </p:spPr>
+      </p:pic>
+      <p:pic>
+        <p:nvPicPr>
+          <p:cNvPr id="7" name="Picture 6">
+            <a:extLst>
+              <a:ext uri="{FF2B5EF4-FFF2-40B4-BE49-F238E27FC236}">
+                <a16:creationId xmlns:a16="http://schemas.microsoft.com/office/drawing/2014/main" id="{E95C28BD-C0D7-3093-EC8E-2719708C5E37}"/>
+              </a:ext>
+            </a:extLst>
+          </p:cNvPr>
+          <p:cNvPicPr>
+            <a:picLocks noChangeAspect="1"/>
+          </p:cNvPicPr>
+          <p:nvPr/>
+        </p:nvPicPr>
+        <p:blipFill>
+          <a:blip r:embed="rId6"/>
+          <a:stretch>
+            <a:fillRect/>
+          </a:stretch>
+        </p:blipFill>
+        <p:spPr>
+          <a:xfrm>
+            <a:off x="1609763" y="1680318"/>
+            <a:ext cx="8972466" cy="4307348"/>
+          </a:xfrm>
+          <a:prstGeom prst="rect">
+            <a:avLst/>
+          </a:prstGeom>
+        </p:spPr>
+      </p:pic>
+      <p:pic>
+        <p:nvPicPr>
+          <p:cNvPr id="8" name="Picture 7">
+            <a:extLst>
+              <a:ext uri="{FF2B5EF4-FFF2-40B4-BE49-F238E27FC236}">
+                <a16:creationId xmlns:a16="http://schemas.microsoft.com/office/drawing/2014/main" id="{F2241B1F-7E2C-A239-47F1-F2BC4370E4E3}"/>
+              </a:ext>
+            </a:extLst>
+          </p:cNvPr>
+          <p:cNvPicPr>
+            <a:picLocks noChangeAspect="1"/>
+          </p:cNvPicPr>
+          <p:nvPr/>
+        </p:nvPicPr>
+        <p:blipFill>
+          <a:blip r:embed="rId7"/>
+          <a:stretch>
+            <a:fillRect/>
+          </a:stretch>
+        </p:blipFill>
+        <p:spPr>
+          <a:xfrm>
+            <a:off x="1609758" y="1701058"/>
+            <a:ext cx="8972466" cy="4295078"/>
+          </a:xfrm>
+          <a:prstGeom prst="rect">
+            <a:avLst/>
+          </a:prstGeom>
+        </p:spPr>
+      </p:pic>
+      <p:pic>
+        <p:nvPicPr>
+          <p:cNvPr id="9" name="Picture 8">
+            <a:extLst>
+              <a:ext uri="{FF2B5EF4-FFF2-40B4-BE49-F238E27FC236}">
+                <a16:creationId xmlns:a16="http://schemas.microsoft.com/office/drawing/2014/main" id="{D15B61C4-9D0B-7D7D-0F8D-0856AF8AEE2C}"/>
+              </a:ext>
+            </a:extLst>
+          </p:cNvPr>
+          <p:cNvPicPr>
+            <a:picLocks noChangeAspect="1"/>
+          </p:cNvPicPr>
+          <p:nvPr/>
+        </p:nvPicPr>
+        <p:blipFill>
+          <a:blip r:embed="rId8"/>
+          <a:stretch>
+            <a:fillRect/>
+          </a:stretch>
+        </p:blipFill>
+        <p:spPr>
+          <a:xfrm>
+            <a:off x="1609750" y="1711428"/>
+            <a:ext cx="8972466" cy="4287313"/>
+          </a:xfrm>
+          <a:prstGeom prst="rect">
+            <a:avLst/>
+          </a:prstGeom>
+        </p:spPr>
+      </p:pic>
+      <p:pic>
+        <p:nvPicPr>
+          <p:cNvPr id="10" name="Picture 9">
+            <a:extLst>
+              <a:ext uri="{FF2B5EF4-FFF2-40B4-BE49-F238E27FC236}">
+                <a16:creationId xmlns:a16="http://schemas.microsoft.com/office/drawing/2014/main" id="{00CDA450-D3C5-A6CD-A386-105068481507}"/>
+              </a:ext>
+            </a:extLst>
+          </p:cNvPr>
+          <p:cNvPicPr>
+            <a:picLocks noChangeAspect="1"/>
+          </p:cNvPicPr>
+          <p:nvPr/>
+        </p:nvPicPr>
+        <p:blipFill>
+          <a:blip r:embed="rId9"/>
+          <a:stretch>
+            <a:fillRect/>
+          </a:stretch>
+        </p:blipFill>
+        <p:spPr>
+          <a:xfrm>
+            <a:off x="1365149" y="1680318"/>
+            <a:ext cx="9217067" cy="4389767"/>
+          </a:xfrm>
+          <a:prstGeom prst="rect">
+            <a:avLst/>
+          </a:prstGeom>
+        </p:spPr>
+      </p:pic>
+    </p:spTree>
+    <p:extLst>
+      <p:ext uri="{BB962C8B-B14F-4D97-AF65-F5344CB8AC3E}">
+        <p14:creationId xmlns:p14="http://schemas.microsoft.com/office/powerpoint/2010/main" val="1485385577"/>
+      </p:ext>
+    </p:extLst>
+  </p:cSld>
+  <p:clrMapOvr>
+    <a:masterClrMapping/>
+  </p:clrMapOvr>
+</p:sld>
+</file>
+
 <file path=ppt/slides/slide2.xml><?xml version="1.0" encoding="utf-8"?>
 <p:sld xmlns:a="http://schemas.openxmlformats.org/drawingml/2006/main" xmlns:r="http://schemas.openxmlformats.org/officeDocument/2006/relationships" xmlns:p="http://schemas.openxmlformats.org/presentationml/2006/main">
   <p:cSld>
@@ -12190,8 +12553,16 @@
           <a:p>
             <a:pPr algn="ctr"/>
             <a:r>
+              <a:rPr lang="en-US"/>
+              <a:t>Detail </a:t>
+            </a:r>
+            <a:r>
+              <a:rPr lang="en-US" dirty="0"/>
+              <a:t>Data </a:t>
+            </a:r>
+            <a:r>
               <a:rPr lang="en-US" dirty="0" err="1"/>
-              <a:t>Regulasi</a:t>
+              <a:t>Provinsi</a:t>
             </a:r>
             <a:endParaRPr lang="en-US" dirty="0"/>
           </a:p>
@@ -12353,7 +12724,7 @@
           <p:cNvPr id="9" name="Picture 8">
             <a:extLst>
               <a:ext uri="{FF2B5EF4-FFF2-40B4-BE49-F238E27FC236}">
-                <a16:creationId xmlns:a16="http://schemas.microsoft.com/office/drawing/2014/main" id="{D15B61C4-9D0B-7D7D-0F8D-0856AF8AEE2C}"/>
+                <a16:creationId xmlns:a16="http://schemas.microsoft.com/office/drawing/2014/main" id="{A1D8706F-C929-9A7C-16A2-975F0EB80101}"/>
               </a:ext>
             </a:extLst>
           </p:cNvPr>
@@ -12370,8 +12741,8 @@
         </p:blipFill>
         <p:spPr>
           <a:xfrm>
-            <a:off x="1609750" y="1711428"/>
-            <a:ext cx="8972466" cy="4287313"/>
+            <a:off x="1609749" y="1665640"/>
+            <a:ext cx="9062401" cy="4330496"/>
           </a:xfrm>
           <a:prstGeom prst="rect">
             <a:avLst/>
@@ -12383,7 +12754,7 @@
           <p:cNvPr id="10" name="Picture 9">
             <a:extLst>
               <a:ext uri="{FF2B5EF4-FFF2-40B4-BE49-F238E27FC236}">
-                <a16:creationId xmlns:a16="http://schemas.microsoft.com/office/drawing/2014/main" id="{00CDA450-D3C5-A6CD-A386-105068481507}"/>
+                <a16:creationId xmlns:a16="http://schemas.microsoft.com/office/drawing/2014/main" id="{D1129E85-2E65-737E-A9D8-E2784A4E37AA}"/>
               </a:ext>
             </a:extLst>
           </p:cNvPr>
@@ -12400,8 +12771,8 @@
         </p:blipFill>
         <p:spPr>
           <a:xfrm>
-            <a:off x="1365149" y="1680318"/>
-            <a:ext cx="9217067" cy="4389767"/>
+            <a:off x="1519832" y="1602394"/>
+            <a:ext cx="9152318" cy="4368694"/>
           </a:xfrm>
           <a:prstGeom prst="rect">
             <a:avLst/>
@@ -12411,7 +12782,7 @@
     </p:spTree>
     <p:extLst>
       <p:ext uri="{BB962C8B-B14F-4D97-AF65-F5344CB8AC3E}">
-        <p14:creationId xmlns:p14="http://schemas.microsoft.com/office/powerpoint/2010/main" val="1485385577"/>
+        <p14:creationId xmlns:p14="http://schemas.microsoft.com/office/powerpoint/2010/main" val="4259771959"/>
       </p:ext>
     </p:extLst>
   </p:cSld>
@@ -13253,15 +13624,6 @@
 </file>
 
 <file path=customXml/item1.xml><?xml version="1.0" encoding="utf-8"?>
-<?mso-contentType ?>
-<FormTemplates xmlns="http://schemas.microsoft.com/sharepoint/v3/contenttype/forms">
-  <Display>DocumentLibraryForm</Display>
-  <Edit>DocumentLibraryForm</Edit>
-  <New>DocumentLibraryForm</New>
-</FormTemplates>
-</file>
-
-<file path=customXml/item2.xml><?xml version="1.0" encoding="utf-8"?>
 <p:properties xmlns:p="http://schemas.microsoft.com/office/2006/metadata/properties" xmlns:xsi="http://www.w3.org/2001/XMLSchema-instance" xmlns:pc="http://schemas.microsoft.com/office/infopath/2007/PartnerControls">
   <documentManagement>
     <_ip_UnifiedCompliancePolicyUIAction xmlns="http://schemas.microsoft.com/sharepoint/v3" xsi:nil="true"/>
@@ -13279,6 +13641,15 @@
     <MediaServiceKeyPoints xmlns="71af3243-3dd4-4a8d-8c0d-dd76da1f02a5" xsi:nil="true"/>
   </documentManagement>
 </p:properties>
+</file>
+
+<file path=customXml/item2.xml><?xml version="1.0" encoding="utf-8"?>
+<?mso-contentType ?>
+<FormTemplates xmlns="http://schemas.microsoft.com/sharepoint/v3/contenttype/forms">
+  <Display>DocumentLibraryForm</Display>
+  <Edit>DocumentLibraryForm</Edit>
+  <New>DocumentLibraryForm</New>
+</FormTemplates>
 </file>
 
 <file path=customXml/item3.xml><?xml version="1.0" encoding="utf-8"?>
@@ -13594,14 +13965,6 @@
 </file>
 
 <file path=customXml/itemProps1.xml><?xml version="1.0" encoding="utf-8"?>
-<ds:datastoreItem xmlns:ds="http://schemas.openxmlformats.org/officeDocument/2006/customXml" ds:itemID="{4E60708A-6461-4D7F-883F-7E25D731D326}">
-  <ds:schemaRefs>
-    <ds:schemaRef ds:uri="http://schemas.microsoft.com/sharepoint/v3/contenttype/forms"/>
-  </ds:schemaRefs>
-</ds:datastoreItem>
-</file>
-
-<file path=customXml/itemProps2.xml><?xml version="1.0" encoding="utf-8"?>
 <ds:datastoreItem xmlns:ds="http://schemas.openxmlformats.org/officeDocument/2006/customXml" ds:itemID="{E130005B-6102-4F3C-A26F-485DF1BF9717}">
   <ds:schemaRefs>
     <ds:schemaRef ds:uri="http://schemas.microsoft.com/office/2006/metadata/properties"/>
@@ -13609,6 +13972,14 @@
     <ds:schemaRef ds:uri="http://schemas.microsoft.com/sharepoint/v3"/>
     <ds:schemaRef ds:uri="71af3243-3dd4-4a8d-8c0d-dd76da1f02a5"/>
     <ds:schemaRef ds:uri="230e9df3-be65-4c73-a93b-d1236ebd677e"/>
+  </ds:schemaRefs>
+</ds:datastoreItem>
+</file>
+
+<file path=customXml/itemProps2.xml><?xml version="1.0" encoding="utf-8"?>
+<ds:datastoreItem xmlns:ds="http://schemas.openxmlformats.org/officeDocument/2006/customXml" ds:itemID="{4E60708A-6461-4D7F-883F-7E25D731D326}">
+  <ds:schemaRefs>
+    <ds:schemaRef ds:uri="http://schemas.microsoft.com/sharepoint/v3/contenttype/forms"/>
   </ds:schemaRefs>
 </ds:datastoreItem>
 </file>

</xml_diff>